<commit_message>
Updated slide deck for Philly.NET Code Camp 2018.2
</commit_message>
<xml_diff>
--- a/View Components in C# core.pptx
+++ b/View Components in C# core.pptx
@@ -11,9 +11,10 @@
     <p:sldId id="263" r:id="rId5"/>
     <p:sldId id="264" r:id="rId6"/>
     <p:sldId id="257" r:id="rId7"/>
-    <p:sldId id="260" r:id="rId8"/>
-    <p:sldId id="262" r:id="rId9"/>
-    <p:sldId id="265" r:id="rId10"/>
+    <p:sldId id="266" r:id="rId8"/>
+    <p:sldId id="260" r:id="rId9"/>
+    <p:sldId id="262" r:id="rId10"/>
+    <p:sldId id="265" r:id="rId11"/>
   </p:sldIdLst>
   <p:sldSz cx="12192000" cy="6858000"/>
   <p:notesSz cx="6858000" cy="9144000"/>
@@ -4402,7 +4403,7 @@
           <a:p>
             <a:fld id="{48A87A34-81AB-432B-8DAE-1953F412C126}" type="datetimeFigureOut">
               <a:rPr lang="en-US" dirty="0"/>
-              <a:t>10/4/2018</a:t>
+              <a:t>11/17/2018</a:t>
             </a:fld>
             <a:endParaRPr lang="en-US" dirty="0"/>
           </a:p>
@@ -4664,7 +4665,7 @@
           <a:p>
             <a:fld id="{48A87A34-81AB-432B-8DAE-1953F412C126}" type="datetimeFigureOut">
               <a:rPr lang="en-US" dirty="0"/>
-              <a:t>10/4/2018</a:t>
+              <a:t>11/17/2018</a:t>
             </a:fld>
             <a:endParaRPr lang="en-US" dirty="0"/>
           </a:p>
@@ -4855,7 +4856,7 @@
           <a:p>
             <a:fld id="{48A87A34-81AB-432B-8DAE-1953F412C126}" type="datetimeFigureOut">
               <a:rPr lang="en-US" dirty="0"/>
-              <a:t>10/4/2018</a:t>
+              <a:t>11/17/2018</a:t>
             </a:fld>
             <a:endParaRPr lang="en-US" dirty="0"/>
           </a:p>
@@ -5113,7 +5114,7 @@
           <a:p>
             <a:fld id="{48A87A34-81AB-432B-8DAE-1953F412C126}" type="datetimeFigureOut">
               <a:rPr lang="en-US" dirty="0"/>
-              <a:t>10/4/2018</a:t>
+              <a:t>11/17/2018</a:t>
             </a:fld>
             <a:endParaRPr lang="en-US" dirty="0"/>
           </a:p>
@@ -5542,7 +5543,7 @@
           <a:p>
             <a:fld id="{48A87A34-81AB-432B-8DAE-1953F412C126}" type="datetimeFigureOut">
               <a:rPr lang="en-US" dirty="0"/>
-              <a:t>10/4/2018</a:t>
+              <a:t>11/17/2018</a:t>
             </a:fld>
             <a:endParaRPr lang="en-US" dirty="0"/>
           </a:p>
@@ -6083,7 +6084,7 @@
           <a:p>
             <a:fld id="{48A87A34-81AB-432B-8DAE-1953F412C126}" type="datetimeFigureOut">
               <a:rPr lang="en-US" dirty="0"/>
-              <a:t>10/4/2018</a:t>
+              <a:t>11/17/2018</a:t>
             </a:fld>
             <a:endParaRPr lang="en-US" dirty="0"/>
           </a:p>
@@ -6798,7 +6799,7 @@
           <a:p>
             <a:fld id="{48A87A34-81AB-432B-8DAE-1953F412C126}" type="datetimeFigureOut">
               <a:rPr lang="en-US" dirty="0"/>
-              <a:t>10/4/2018</a:t>
+              <a:t>11/17/2018</a:t>
             </a:fld>
             <a:endParaRPr lang="en-US" dirty="0"/>
           </a:p>
@@ -6963,7 +6964,7 @@
           <a:p>
             <a:fld id="{48A87A34-81AB-432B-8DAE-1953F412C126}" type="datetimeFigureOut">
               <a:rPr lang="en-US" dirty="0"/>
-              <a:t>10/4/2018</a:t>
+              <a:t>11/17/2018</a:t>
             </a:fld>
             <a:endParaRPr lang="en-US" dirty="0"/>
           </a:p>
@@ -7138,7 +7139,7 @@
           <a:p>
             <a:fld id="{48A87A34-81AB-432B-8DAE-1953F412C126}" type="datetimeFigureOut">
               <a:rPr lang="en-US" dirty="0"/>
-              <a:t>10/4/2018</a:t>
+              <a:t>11/17/2018</a:t>
             </a:fld>
             <a:endParaRPr lang="en-US" dirty="0"/>
           </a:p>
@@ -7303,7 +7304,7 @@
           <a:p>
             <a:fld id="{48A87A34-81AB-432B-8DAE-1953F412C126}" type="datetimeFigureOut">
               <a:rPr lang="en-US" dirty="0"/>
-              <a:t>10/4/2018</a:t>
+              <a:t>11/17/2018</a:t>
             </a:fld>
             <a:endParaRPr lang="en-US" dirty="0"/>
           </a:p>
@@ -7548,7 +7549,7 @@
           <a:p>
             <a:fld id="{48A87A34-81AB-432B-8DAE-1953F412C126}" type="datetimeFigureOut">
               <a:rPr lang="en-US" dirty="0"/>
-              <a:t>10/4/2018</a:t>
+              <a:t>11/17/2018</a:t>
             </a:fld>
             <a:endParaRPr lang="en-US" dirty="0"/>
           </a:p>
@@ -7775,7 +7776,7 @@
           <a:p>
             <a:fld id="{48A87A34-81AB-432B-8DAE-1953F412C126}" type="datetimeFigureOut">
               <a:rPr lang="en-US" dirty="0"/>
-              <a:t>10/4/2018</a:t>
+              <a:t>11/17/2018</a:t>
             </a:fld>
             <a:endParaRPr lang="en-US" dirty="0"/>
           </a:p>
@@ -8151,7 +8152,7 @@
           <a:p>
             <a:fld id="{48A87A34-81AB-432B-8DAE-1953F412C126}" type="datetimeFigureOut">
               <a:rPr lang="en-US" dirty="0"/>
-              <a:t>10/4/2018</a:t>
+              <a:t>11/17/2018</a:t>
             </a:fld>
             <a:endParaRPr lang="en-US" dirty="0"/>
           </a:p>
@@ -8264,7 +8265,7 @@
           <a:p>
             <a:fld id="{48A87A34-81AB-432B-8DAE-1953F412C126}" type="datetimeFigureOut">
               <a:rPr lang="en-US" dirty="0"/>
-              <a:t>10/4/2018</a:t>
+              <a:t>11/17/2018</a:t>
             </a:fld>
             <a:endParaRPr lang="en-US" dirty="0"/>
           </a:p>
@@ -8354,7 +8355,7 @@
           <a:p>
             <a:fld id="{48A87A34-81AB-432B-8DAE-1953F412C126}" type="datetimeFigureOut">
               <a:rPr lang="en-US" dirty="0"/>
-              <a:t>10/4/2018</a:t>
+              <a:t>11/17/2018</a:t>
             </a:fld>
             <a:endParaRPr lang="en-US" dirty="0"/>
           </a:p>
@@ -8598,7 +8599,7 @@
           <a:p>
             <a:fld id="{48A87A34-81AB-432B-8DAE-1953F412C126}" type="datetimeFigureOut">
               <a:rPr lang="en-US" dirty="0"/>
-              <a:t>10/4/2018</a:t>
+              <a:t>11/17/2018</a:t>
             </a:fld>
             <a:endParaRPr lang="en-US" dirty="0"/>
           </a:p>
@@ -8873,7 +8874,7 @@
           <a:p>
             <a:fld id="{48A87A34-81AB-432B-8DAE-1953F412C126}" type="datetimeFigureOut">
               <a:rPr lang="en-US" dirty="0"/>
-              <a:t>10/4/2018</a:t>
+              <a:t>11/17/2018</a:t>
             </a:fld>
             <a:endParaRPr lang="en-US" dirty="0"/>
           </a:p>
@@ -11936,7 +11937,7 @@
             <a:fld id="{48A87A34-81AB-432B-8DAE-1953F412C126}" type="datetimeFigureOut">
               <a:rPr lang="en-US" dirty="0"/>
               <a:pPr/>
-              <a:t>10/4/2018</a:t>
+              <a:t>11/17/2018</a:t>
             </a:fld>
             <a:endParaRPr lang="en-US" dirty="0"/>
           </a:p>
@@ -12429,6 +12430,112 @@
 </p:sld>
 </file>
 
+<file path=ppt/slides/slide10.xml><?xml version="1.0" encoding="utf-8"?>
+<p:sld xmlns:a="http://schemas.openxmlformats.org/drawingml/2006/main" xmlns:r="http://schemas.openxmlformats.org/officeDocument/2006/relationships" xmlns:p="http://schemas.openxmlformats.org/presentationml/2006/main">
+  <p:cSld>
+    <p:spTree>
+      <p:nvGrpSpPr>
+        <p:cNvPr id="1" name=""/>
+        <p:cNvGrpSpPr/>
+        <p:nvPr/>
+      </p:nvGrpSpPr>
+      <p:grpSpPr>
+        <a:xfrm>
+          <a:off x="0" y="0"/>
+          <a:ext cx="0" cy="0"/>
+          <a:chOff x="0" y="0"/>
+          <a:chExt cx="0" cy="0"/>
+        </a:xfrm>
+      </p:grpSpPr>
+      <p:sp>
+        <p:nvSpPr>
+          <p:cNvPr id="2" name="Title 1">
+            <a:extLst>
+              <a:ext uri="{FF2B5EF4-FFF2-40B4-BE49-F238E27FC236}">
+                <a16:creationId xmlns:a16="http://schemas.microsoft.com/office/drawing/2014/main" id="{9FDDD181-F0D0-4C8C-B26D-39B6D0192200}"/>
+              </a:ext>
+            </a:extLst>
+          </p:cNvPr>
+          <p:cNvSpPr>
+            <a:spLocks noGrp="1"/>
+          </p:cNvSpPr>
+          <p:nvPr>
+            <p:ph type="title"/>
+          </p:nvPr>
+        </p:nvSpPr>
+        <p:spPr/>
+        <p:txBody>
+          <a:bodyPr/>
+          <a:lstStyle/>
+          <a:p>
+            <a:r>
+              <a:rPr lang="en-US" dirty="0"/>
+              <a:t>Contact info</a:t>
+            </a:r>
+          </a:p>
+        </p:txBody>
+      </p:sp>
+      <p:sp>
+        <p:nvSpPr>
+          <p:cNvPr id="3" name="Content Placeholder 2">
+            <a:extLst>
+              <a:ext uri="{FF2B5EF4-FFF2-40B4-BE49-F238E27FC236}">
+                <a16:creationId xmlns:a16="http://schemas.microsoft.com/office/drawing/2014/main" id="{8A3C7A79-A641-4B50-8095-A321A7AA161C}"/>
+              </a:ext>
+            </a:extLst>
+          </p:cNvPr>
+          <p:cNvSpPr>
+            <a:spLocks noGrp="1"/>
+          </p:cNvSpPr>
+          <p:nvPr>
+            <p:ph idx="1"/>
+          </p:nvPr>
+        </p:nvSpPr>
+        <p:spPr/>
+        <p:txBody>
+          <a:bodyPr/>
+          <a:lstStyle/>
+          <a:p>
+            <a:r>
+              <a:rPr lang="en-US" dirty="0"/>
+              <a:t>github.com/</a:t>
+            </a:r>
+            <a:r>
+              <a:rPr lang="en-US" dirty="0" err="1"/>
+              <a:t>annabateman</a:t>
+            </a:r>
+            <a:endParaRPr lang="en-US" dirty="0"/>
+          </a:p>
+          <a:p>
+            <a:r>
+              <a:rPr lang="en-US" dirty="0">
+                <a:hlinkClick r:id="rId2"/>
+              </a:rPr>
+              <a:t>www.linkedin.com/in/anna-bateman</a:t>
+            </a:r>
+            <a:endParaRPr lang="en-US" dirty="0"/>
+          </a:p>
+          <a:p>
+            <a:r>
+              <a:rPr lang="en-US" dirty="0"/>
+              <a:t>mrsbateman@hotmail.com</a:t>
+            </a:r>
+          </a:p>
+        </p:txBody>
+      </p:sp>
+    </p:spTree>
+    <p:extLst>
+      <p:ext uri="{BB962C8B-B14F-4D97-AF65-F5344CB8AC3E}">
+        <p14:creationId xmlns:p14="http://schemas.microsoft.com/office/powerpoint/2010/main" val="2409485746"/>
+      </p:ext>
+    </p:extLst>
+  </p:cSld>
+  <p:clrMapOvr>
+    <a:masterClrMapping/>
+  </p:clrMapOvr>
+</p:sld>
+</file>
+
 <file path=ppt/slides/slide2.xml><?xml version="1.0" encoding="utf-8"?>
 <p:sld xmlns:a="http://schemas.openxmlformats.org/drawingml/2006/main" xmlns:r="http://schemas.openxmlformats.org/officeDocument/2006/relationships" xmlns:p="http://schemas.openxmlformats.org/presentationml/2006/main">
   <p:cSld>
@@ -12654,6 +12761,24 @@
               <a:rPr lang="en-US" dirty="0"/>
               <a:t>: FirstName to First Name)</a:t>
             </a:r>
+          </a:p>
+          <a:p>
+            <a:r>
+              <a:rPr lang="en-US" dirty="0"/>
+              <a:t>Model Metadata Provider</a:t>
+            </a:r>
+          </a:p>
+          <a:p>
+            <a:pPr lvl="1"/>
+            <a:r>
+              <a:rPr lang="en-US" dirty="0"/>
+              <a:t>Uses the extension method to set the display name for model properties if the developer has not set one. Using this, the developer only needs to annotate the display name when it doesn’t match the </a:t>
+            </a:r>
+            <a:r>
+              <a:rPr lang="en-US"/>
+              <a:t>property name.</a:t>
+            </a:r>
+            <a:endParaRPr lang="en-US" dirty="0"/>
           </a:p>
           <a:p>
             <a:r>
@@ -13016,7 +13141,7 @@
         </p:spPr>
         <p:txBody>
           <a:bodyPr>
-            <a:normAutofit/>
+            <a:normAutofit lnSpcReduction="10000"/>
           </a:bodyPr>
           <a:lstStyle/>
           <a:p>
@@ -13180,6 +13305,27 @@
                 <a:cs typeface="Courier New" panose="02070309020205020404" pitchFamily="49" charset="0"/>
               </a:rPr>
               <a:t>Use the tag helper in your view</a:t>
+            </a:r>
+          </a:p>
+          <a:p>
+            <a:pPr lvl="1"/>
+            <a:r>
+              <a:rPr lang="en-US" dirty="0">
+                <a:cs typeface="Courier New" panose="02070309020205020404" pitchFamily="49" charset="0"/>
+              </a:rPr>
+              <a:t>Note the automatic change from Camel Case to Snake Case (</a:t>
+            </a:r>
+            <a:r>
+              <a:rPr lang="en-US" dirty="0" err="1">
+                <a:cs typeface="Courier New" panose="02070309020205020404" pitchFamily="49" charset="0"/>
+              </a:rPr>
+              <a:t>FilmDetail</a:t>
+            </a:r>
+            <a:r>
+              <a:rPr lang="en-US" dirty="0">
+                <a:cs typeface="Courier New" panose="02070309020205020404" pitchFamily="49" charset="0"/>
+              </a:rPr>
+              <a:t> =&gt; film-detail)</a:t>
             </a:r>
           </a:p>
           <a:p>
@@ -13221,7 +13367,7 @@
         </p:blipFill>
         <p:spPr>
           <a:xfrm>
-            <a:off x="1721716" y="5009739"/>
+            <a:off x="1721716" y="4819239"/>
             <a:ext cx="4859204" cy="347086"/>
           </a:xfrm>
           <a:prstGeom prst="rect">
@@ -13251,7 +13397,7 @@
         </p:blipFill>
         <p:spPr>
           <a:xfrm>
-            <a:off x="1721716" y="4616832"/>
+            <a:off x="1721716" y="4426332"/>
             <a:ext cx="10308454" cy="347086"/>
           </a:xfrm>
           <a:prstGeom prst="rect">
@@ -13281,7 +13427,7 @@
         </p:blipFill>
         <p:spPr>
           <a:xfrm>
-            <a:off x="1721716" y="5938218"/>
+            <a:off x="1721716" y="6065939"/>
             <a:ext cx="5401510" cy="347085"/>
           </a:xfrm>
           <a:prstGeom prst="rect">
@@ -13461,6 +13607,222 @@
       </p:grpSpPr>
       <p:sp>
         <p:nvSpPr>
+          <p:cNvPr id="2" name="Title 1">
+            <a:extLst>
+              <a:ext uri="{FF2B5EF4-FFF2-40B4-BE49-F238E27FC236}">
+                <a16:creationId xmlns:a16="http://schemas.microsoft.com/office/drawing/2014/main" id="{4E239C40-9A32-426D-8800-CD97FB2138DF}"/>
+              </a:ext>
+            </a:extLst>
+          </p:cNvPr>
+          <p:cNvSpPr>
+            <a:spLocks noGrp="1"/>
+          </p:cNvSpPr>
+          <p:nvPr>
+            <p:ph type="title"/>
+          </p:nvPr>
+        </p:nvSpPr>
+        <p:spPr>
+          <a:xfrm>
+            <a:off x="1141413" y="618518"/>
+            <a:ext cx="9905998" cy="591157"/>
+          </a:xfrm>
+        </p:spPr>
+        <p:txBody>
+          <a:bodyPr/>
+          <a:lstStyle/>
+          <a:p>
+            <a:r>
+              <a:rPr lang="en-US" dirty="0"/>
+              <a:t>Create a view component</a:t>
+            </a:r>
+          </a:p>
+        </p:txBody>
+      </p:sp>
+      <p:sp>
+        <p:nvSpPr>
+          <p:cNvPr id="3" name="Content Placeholder 2">
+            <a:extLst>
+              <a:ext uri="{FF2B5EF4-FFF2-40B4-BE49-F238E27FC236}">
+                <a16:creationId xmlns:a16="http://schemas.microsoft.com/office/drawing/2014/main" id="{2530E4DC-E87E-4CAF-A792-780CF21E894E}"/>
+              </a:ext>
+            </a:extLst>
+          </p:cNvPr>
+          <p:cNvSpPr>
+            <a:spLocks noGrp="1"/>
+          </p:cNvSpPr>
+          <p:nvPr>
+            <p:ph idx="1"/>
+          </p:nvPr>
+        </p:nvSpPr>
+        <p:spPr>
+          <a:xfrm>
+            <a:off x="1143000" y="1430337"/>
+            <a:ext cx="9905999" cy="3541714"/>
+          </a:xfrm>
+        </p:spPr>
+        <p:txBody>
+          <a:bodyPr>
+            <a:normAutofit fontScale="92500" lnSpcReduction="20000"/>
+          </a:bodyPr>
+          <a:lstStyle/>
+          <a:p>
+            <a:r>
+              <a:rPr lang="en-US" dirty="0"/>
+              <a:t>Create </a:t>
+            </a:r>
+            <a:r>
+              <a:rPr lang="en-US" dirty="0" err="1"/>
+              <a:t>ViewComponent</a:t>
+            </a:r>
+            <a:r>
+              <a:rPr lang="en-US" dirty="0"/>
+              <a:t> by extending the </a:t>
+            </a:r>
+            <a:r>
+              <a:rPr lang="en-US" dirty="0" err="1"/>
+              <a:t>ViewComponent</a:t>
+            </a:r>
+            <a:r>
+              <a:rPr lang="en-US" dirty="0"/>
+              <a:t> class</a:t>
+            </a:r>
+          </a:p>
+          <a:p>
+            <a:pPr lvl="1"/>
+            <a:r>
+              <a:rPr lang="en-US" dirty="0"/>
+              <a:t>Can be done by decorating the class as well [</a:t>
+            </a:r>
+            <a:r>
+              <a:rPr lang="en-US" dirty="0" err="1"/>
+              <a:t>ViewComponent</a:t>
+            </a:r>
+            <a:r>
+              <a:rPr lang="en-US" dirty="0"/>
+              <a:t>]</a:t>
+            </a:r>
+          </a:p>
+          <a:p>
+            <a:r>
+              <a:rPr lang="en-US" dirty="0"/>
+              <a:t>Override the Invoke method, adding your own parameters as needed</a:t>
+            </a:r>
+          </a:p>
+          <a:p>
+            <a:r>
+              <a:rPr lang="en-US" dirty="0"/>
+              <a:t>Create the Razor View</a:t>
+            </a:r>
+          </a:p>
+          <a:p>
+            <a:pPr lvl="1"/>
+            <a:r>
+              <a:rPr lang="en-US" dirty="0"/>
+              <a:t>Path is important, Microsoft looks for your view in the following path: Views/Shared/Components/&lt;</a:t>
+            </a:r>
+            <a:r>
+              <a:rPr lang="en-US" dirty="0" err="1"/>
+              <a:t>view_component_name</a:t>
+            </a:r>
+            <a:r>
+              <a:rPr lang="en-US" dirty="0"/>
+              <a:t>&gt;/&lt;</a:t>
+            </a:r>
+            <a:r>
+              <a:rPr lang="en-US" dirty="0" err="1"/>
+              <a:t>view_name</a:t>
+            </a:r>
+            <a:r>
+              <a:rPr lang="en-US" dirty="0"/>
+              <a:t>&gt;</a:t>
+            </a:r>
+          </a:p>
+          <a:p>
+            <a:pPr lvl="1"/>
+            <a:r>
+              <a:rPr lang="en-US" dirty="0"/>
+              <a:t>Any name is fine, </a:t>
+            </a:r>
+            <a:r>
+              <a:rPr lang="en-US" dirty="0" err="1"/>
+              <a:t>Default.cshtml</a:t>
+            </a:r>
+            <a:r>
+              <a:rPr lang="en-US" dirty="0"/>
+              <a:t> is convention</a:t>
+            </a:r>
+          </a:p>
+          <a:p>
+            <a:r>
+              <a:rPr lang="en-US" dirty="0"/>
+              <a:t>To invoke the method on the page, use the tag helper syntax, prefacing it with </a:t>
+            </a:r>
+            <a:r>
+              <a:rPr lang="en-US" dirty="0" err="1"/>
+              <a:t>vc</a:t>
+            </a:r>
+            <a:r>
+              <a:rPr lang="en-US" dirty="0"/>
+              <a:t>:</a:t>
+            </a:r>
+          </a:p>
+          <a:p>
+            <a:pPr lvl="1"/>
+            <a:r>
+              <a:rPr lang="en-US" dirty="0"/>
+              <a:t>&lt;</a:t>
+            </a:r>
+            <a:r>
+              <a:rPr lang="en-US" dirty="0" err="1"/>
+              <a:t>vc:souped-up-grid</a:t>
+            </a:r>
+            <a:r>
+              <a:rPr lang="en-US" dirty="0"/>
+              <a:t> …&gt;&lt;/</a:t>
+            </a:r>
+            <a:r>
+              <a:rPr lang="en-US" dirty="0" err="1"/>
+              <a:t>vc:souped-up-grid</a:t>
+            </a:r>
+            <a:r>
+              <a:rPr lang="en-US" dirty="0"/>
+              <a:t>&gt;</a:t>
+            </a:r>
+          </a:p>
+        </p:txBody>
+      </p:sp>
+    </p:spTree>
+    <p:extLst>
+      <p:ext uri="{BB962C8B-B14F-4D97-AF65-F5344CB8AC3E}">
+        <p14:creationId xmlns:p14="http://schemas.microsoft.com/office/powerpoint/2010/main" val="939000682"/>
+      </p:ext>
+    </p:extLst>
+  </p:cSld>
+  <p:clrMapOvr>
+    <a:masterClrMapping/>
+  </p:clrMapOvr>
+</p:sld>
+</file>
+
+<file path=ppt/slides/slide8.xml><?xml version="1.0" encoding="utf-8"?>
+<p:sld xmlns:a="http://schemas.openxmlformats.org/drawingml/2006/main" xmlns:r="http://schemas.openxmlformats.org/officeDocument/2006/relationships" xmlns:p="http://schemas.openxmlformats.org/presentationml/2006/main">
+  <p:cSld>
+    <p:spTree>
+      <p:nvGrpSpPr>
+        <p:cNvPr id="1" name=""/>
+        <p:cNvGrpSpPr/>
+        <p:nvPr/>
+      </p:nvGrpSpPr>
+      <p:grpSpPr>
+        <a:xfrm>
+          <a:off x="0" y="0"/>
+          <a:ext cx="0" cy="0"/>
+          <a:chOff x="0" y="0"/>
+          <a:chExt cx="0" cy="0"/>
+        </a:xfrm>
+      </p:grpSpPr>
+      <p:sp>
+        <p:nvSpPr>
           <p:cNvPr id="6" name="Title 5">
             <a:extLst>
               <a:ext uri="{FF2B5EF4-FFF2-40B4-BE49-F238E27FC236}">
@@ -13516,7 +13878,7 @@
         </p:spPr>
         <p:txBody>
           <a:bodyPr>
-            <a:normAutofit fontScale="92500" lnSpcReduction="10000"/>
+            <a:normAutofit/>
           </a:bodyPr>
           <a:lstStyle/>
           <a:p>
@@ -13540,93 +13902,6 @@
               <a:t>Microsoft.AspNetCore.Mvc</a:t>
             </a:r>
             <a:endParaRPr lang="en-US" dirty="0"/>
-          </a:p>
-          <a:p>
-            <a:r>
-              <a:rPr lang="en-US" dirty="0"/>
-              <a:t>Create </a:t>
-            </a:r>
-            <a:r>
-              <a:rPr lang="en-US" dirty="0" err="1"/>
-              <a:t>ViewComponent</a:t>
-            </a:r>
-            <a:r>
-              <a:rPr lang="en-US" dirty="0"/>
-              <a:t> by extending the </a:t>
-            </a:r>
-            <a:r>
-              <a:rPr lang="en-US" dirty="0" err="1"/>
-              <a:t>ViewComponent</a:t>
-            </a:r>
-            <a:r>
-              <a:rPr lang="en-US" dirty="0"/>
-              <a:t> class</a:t>
-            </a:r>
-          </a:p>
-          <a:p>
-            <a:pPr lvl="1"/>
-            <a:r>
-              <a:rPr lang="en-US" dirty="0"/>
-              <a:t>Can be done by decorating the class as well [</a:t>
-            </a:r>
-            <a:r>
-              <a:rPr lang="en-US" dirty="0" err="1"/>
-              <a:t>ViewComponent</a:t>
-            </a:r>
-            <a:r>
-              <a:rPr lang="en-US" dirty="0"/>
-              <a:t>]</a:t>
-            </a:r>
-          </a:p>
-          <a:p>
-            <a:r>
-              <a:rPr lang="en-US" dirty="0"/>
-              <a:t>Override the Invoke method, adding your own parameters as needed</a:t>
-            </a:r>
-          </a:p>
-          <a:p>
-            <a:r>
-              <a:rPr lang="en-US" dirty="0"/>
-              <a:t>Create the Razor View</a:t>
-            </a:r>
-          </a:p>
-          <a:p>
-            <a:pPr lvl="1"/>
-            <a:r>
-              <a:rPr lang="en-US" dirty="0"/>
-              <a:t>Path is important, Microsoft recommends: Views/Shared/Components/&lt;</a:t>
-            </a:r>
-            <a:r>
-              <a:rPr lang="en-US" dirty="0" err="1"/>
-              <a:t>view_component_name</a:t>
-            </a:r>
-            <a:r>
-              <a:rPr lang="en-US" dirty="0"/>
-              <a:t>&gt;/&lt;</a:t>
-            </a:r>
-            <a:r>
-              <a:rPr lang="en-US" dirty="0" err="1"/>
-              <a:t>view_name</a:t>
-            </a:r>
-            <a:r>
-              <a:rPr lang="en-US" dirty="0"/>
-              <a:t>&gt;</a:t>
-            </a:r>
-          </a:p>
-          <a:p>
-            <a:pPr lvl="1"/>
-            <a:r>
-              <a:rPr lang="en-US" dirty="0"/>
-              <a:t>Any name is fine, </a:t>
-            </a:r>
-            <a:r>
-              <a:rPr lang="en-US" dirty="0" err="1"/>
-              <a:t>Default.cshtml</a:t>
-            </a:r>
-            <a:r>
-              <a:rPr lang="en-US" dirty="0"/>
-              <a:t> is convention</a:t>
-            </a:r>
           </a:p>
           <a:p>
             <a:r>
@@ -13674,7 +13949,7 @@
 </p:sld>
 </file>
 
-<file path=ppt/slides/slide8.xml><?xml version="1.0" encoding="utf-8"?>
+<file path=ppt/slides/slide9.xml><?xml version="1.0" encoding="utf-8"?>
 <p:sld xmlns:a="http://schemas.openxmlformats.org/drawingml/2006/main" xmlns:r="http://schemas.openxmlformats.org/officeDocument/2006/relationships" xmlns:p="http://schemas.openxmlformats.org/presentationml/2006/main">
   <p:cSld>
     <p:spTree>
@@ -13755,7 +14030,9 @@
           </a:xfrm>
         </p:spPr>
         <p:txBody>
-          <a:bodyPr/>
+          <a:bodyPr>
+            <a:normAutofit fontScale="92500" lnSpcReduction="10000"/>
+          </a:bodyPr>
           <a:lstStyle/>
           <a:p>
             <a:r>
@@ -13827,6 +14104,17 @@
               <a:rPr lang="en-US" dirty="0"/>
               <a:t>Can use Invoke syntax but that’s cumbersome</a:t>
             </a:r>
+          </a:p>
+          <a:p>
+            <a:r>
+              <a:rPr lang="en-US" dirty="0"/>
+              <a:t>***Note: If you create your own Razor View page that matches the one in the external class library, it will use the one in your web application – I would not recommend this technique as the point is to have a consistent, </a:t>
+            </a:r>
+            <a:r>
+              <a:rPr lang="en-US"/>
+              <a:t>reusable component</a:t>
+            </a:r>
+            <a:endParaRPr lang="en-US" dirty="0"/>
           </a:p>
           <a:p>
             <a:endParaRPr lang="en-US" dirty="0"/>
@@ -13837,112 +14125,6 @@
     <p:extLst>
       <p:ext uri="{BB962C8B-B14F-4D97-AF65-F5344CB8AC3E}">
         <p14:creationId xmlns:p14="http://schemas.microsoft.com/office/powerpoint/2010/main" val="3770532745"/>
-      </p:ext>
-    </p:extLst>
-  </p:cSld>
-  <p:clrMapOvr>
-    <a:masterClrMapping/>
-  </p:clrMapOvr>
-</p:sld>
-</file>
-
-<file path=ppt/slides/slide9.xml><?xml version="1.0" encoding="utf-8"?>
-<p:sld xmlns:a="http://schemas.openxmlformats.org/drawingml/2006/main" xmlns:r="http://schemas.openxmlformats.org/officeDocument/2006/relationships" xmlns:p="http://schemas.openxmlformats.org/presentationml/2006/main">
-  <p:cSld>
-    <p:spTree>
-      <p:nvGrpSpPr>
-        <p:cNvPr id="1" name=""/>
-        <p:cNvGrpSpPr/>
-        <p:nvPr/>
-      </p:nvGrpSpPr>
-      <p:grpSpPr>
-        <a:xfrm>
-          <a:off x="0" y="0"/>
-          <a:ext cx="0" cy="0"/>
-          <a:chOff x="0" y="0"/>
-          <a:chExt cx="0" cy="0"/>
-        </a:xfrm>
-      </p:grpSpPr>
-      <p:sp>
-        <p:nvSpPr>
-          <p:cNvPr id="2" name="Title 1">
-            <a:extLst>
-              <a:ext uri="{FF2B5EF4-FFF2-40B4-BE49-F238E27FC236}">
-                <a16:creationId xmlns:a16="http://schemas.microsoft.com/office/drawing/2014/main" id="{9FDDD181-F0D0-4C8C-B26D-39B6D0192200}"/>
-              </a:ext>
-            </a:extLst>
-          </p:cNvPr>
-          <p:cNvSpPr>
-            <a:spLocks noGrp="1"/>
-          </p:cNvSpPr>
-          <p:nvPr>
-            <p:ph type="title"/>
-          </p:nvPr>
-        </p:nvSpPr>
-        <p:spPr/>
-        <p:txBody>
-          <a:bodyPr/>
-          <a:lstStyle/>
-          <a:p>
-            <a:r>
-              <a:rPr lang="en-US" dirty="0"/>
-              <a:t>Contact info</a:t>
-            </a:r>
-          </a:p>
-        </p:txBody>
-      </p:sp>
-      <p:sp>
-        <p:nvSpPr>
-          <p:cNvPr id="3" name="Content Placeholder 2">
-            <a:extLst>
-              <a:ext uri="{FF2B5EF4-FFF2-40B4-BE49-F238E27FC236}">
-                <a16:creationId xmlns:a16="http://schemas.microsoft.com/office/drawing/2014/main" id="{8A3C7A79-A641-4B50-8095-A321A7AA161C}"/>
-              </a:ext>
-            </a:extLst>
-          </p:cNvPr>
-          <p:cNvSpPr>
-            <a:spLocks noGrp="1"/>
-          </p:cNvSpPr>
-          <p:nvPr>
-            <p:ph idx="1"/>
-          </p:nvPr>
-        </p:nvSpPr>
-        <p:spPr/>
-        <p:txBody>
-          <a:bodyPr/>
-          <a:lstStyle/>
-          <a:p>
-            <a:r>
-              <a:rPr lang="en-US" dirty="0"/>
-              <a:t>github.com/</a:t>
-            </a:r>
-            <a:r>
-              <a:rPr lang="en-US" dirty="0" err="1"/>
-              <a:t>annabateman</a:t>
-            </a:r>
-            <a:endParaRPr lang="en-US" dirty="0"/>
-          </a:p>
-          <a:p>
-            <a:r>
-              <a:rPr lang="en-US" dirty="0">
-                <a:hlinkClick r:id="rId2"/>
-              </a:rPr>
-              <a:t>www.linkedin.com/in/anna-bateman</a:t>
-            </a:r>
-            <a:endParaRPr lang="en-US" dirty="0"/>
-          </a:p>
-          <a:p>
-            <a:r>
-              <a:rPr lang="en-US" dirty="0"/>
-              <a:t>mrsbateman@hotmail.com</a:t>
-            </a:r>
-          </a:p>
-        </p:txBody>
-      </p:sp>
-    </p:spTree>
-    <p:extLst>
-      <p:ext uri="{BB962C8B-B14F-4D97-AF65-F5344CB8AC3E}">
-        <p14:creationId xmlns:p14="http://schemas.microsoft.com/office/powerpoint/2010/main" val="2409485746"/>
       </p:ext>
     </p:extLst>
   </p:cSld>

</xml_diff>